<commit_message>
finish social desir bias, finish force plate F
</commit_message>
<xml_diff>
--- a/HON 394/Social Desirability Bias.pptx
+++ b/HON 394/Social Desirability Bias.pptx
@@ -7,10 +7,13 @@
   <p:sldIdLst>
     <p:sldId id="256" r:id="rId2"/>
     <p:sldId id="257" r:id="rId3"/>
-    <p:sldId id="258" r:id="rId4"/>
-    <p:sldId id="259" r:id="rId5"/>
-    <p:sldId id="260" r:id="rId6"/>
-    <p:sldId id="261" r:id="rId7"/>
+    <p:sldId id="263" r:id="rId4"/>
+    <p:sldId id="258" r:id="rId5"/>
+    <p:sldId id="259" r:id="rId6"/>
+    <p:sldId id="262" r:id="rId7"/>
+    <p:sldId id="260" r:id="rId8"/>
+    <p:sldId id="261" r:id="rId9"/>
+    <p:sldId id="264" r:id="rId10"/>
   </p:sldIdLst>
   <p:sldSz cx="9144000" cy="6858000" type="screen4x3"/>
   <p:notesSz cx="6858000" cy="9144000"/>
@@ -109,7 +112,16 @@
       </a:defRPr>
     </a:lvl9pPr>
   </p:defaultTextStyle>
+  <p:extLst>
+    <p:ext uri="{EFAFB233-063F-42B5-8137-9DF3F51BA10A}">
+      <p15:sldGuideLst xmlns:p15="http://schemas.microsoft.com/office/powerpoint/2012/main"/>
+    </p:ext>
+  </p:extLst>
 </p:presentation>
+</file>
+
+<file path=ppt/revisionInfo.xml><?xml version="1.0" encoding="utf-8"?>
+<p1510:revInfo xmlns:a="http://schemas.openxmlformats.org/drawingml/2006/main" xmlns:r="http://schemas.openxmlformats.org/officeDocument/2006/relationships" xmlns:p1510="http://schemas.microsoft.com/office/powerpoint/2015/10/main"/>
 </file>
 
 <file path=ppt/slideLayouts/slideLayout1.xml><?xml version="1.0" encoding="utf-8"?>
@@ -243,7 +255,7 @@
           <a:p>
             <a:fld id="{25906620-5188-4EA4-AA0A-D417215D4777}" type="datetimeFigureOut">
               <a:rPr lang="en-US" smtClean="0"/>
-              <a:t>1/24/2018</a:t>
+              <a:t>1/31/2018</a:t>
             </a:fld>
             <a:endParaRPr lang="en-US"/>
           </a:p>
@@ -413,7 +425,7 @@
           <a:p>
             <a:fld id="{25906620-5188-4EA4-AA0A-D417215D4777}" type="datetimeFigureOut">
               <a:rPr lang="en-US" smtClean="0"/>
-              <a:t>1/24/2018</a:t>
+              <a:t>1/31/2018</a:t>
             </a:fld>
             <a:endParaRPr lang="en-US"/>
           </a:p>
@@ -593,7 +605,7 @@
           <a:p>
             <a:fld id="{25906620-5188-4EA4-AA0A-D417215D4777}" type="datetimeFigureOut">
               <a:rPr lang="en-US" smtClean="0"/>
-              <a:t>1/24/2018</a:t>
+              <a:t>1/31/2018</a:t>
             </a:fld>
             <a:endParaRPr lang="en-US"/>
           </a:p>
@@ -763,7 +775,7 @@
           <a:p>
             <a:fld id="{25906620-5188-4EA4-AA0A-D417215D4777}" type="datetimeFigureOut">
               <a:rPr lang="en-US" smtClean="0"/>
-              <a:t>1/24/2018</a:t>
+              <a:t>1/31/2018</a:t>
             </a:fld>
             <a:endParaRPr lang="en-US"/>
           </a:p>
@@ -1007,7 +1019,7 @@
           <a:p>
             <a:fld id="{25906620-5188-4EA4-AA0A-D417215D4777}" type="datetimeFigureOut">
               <a:rPr lang="en-US" smtClean="0"/>
-              <a:t>1/24/2018</a:t>
+              <a:t>1/31/2018</a:t>
             </a:fld>
             <a:endParaRPr lang="en-US"/>
           </a:p>
@@ -1239,7 +1251,7 @@
           <a:p>
             <a:fld id="{25906620-5188-4EA4-AA0A-D417215D4777}" type="datetimeFigureOut">
               <a:rPr lang="en-US" smtClean="0"/>
-              <a:t>1/24/2018</a:t>
+              <a:t>1/31/2018</a:t>
             </a:fld>
             <a:endParaRPr lang="en-US"/>
           </a:p>
@@ -1606,7 +1618,7 @@
           <a:p>
             <a:fld id="{25906620-5188-4EA4-AA0A-D417215D4777}" type="datetimeFigureOut">
               <a:rPr lang="en-US" smtClean="0"/>
-              <a:t>1/24/2018</a:t>
+              <a:t>1/31/2018</a:t>
             </a:fld>
             <a:endParaRPr lang="en-US"/>
           </a:p>
@@ -1724,7 +1736,7 @@
           <a:p>
             <a:fld id="{25906620-5188-4EA4-AA0A-D417215D4777}" type="datetimeFigureOut">
               <a:rPr lang="en-US" smtClean="0"/>
-              <a:t>1/24/2018</a:t>
+              <a:t>1/31/2018</a:t>
             </a:fld>
             <a:endParaRPr lang="en-US"/>
           </a:p>
@@ -1819,7 +1831,7 @@
           <a:p>
             <a:fld id="{25906620-5188-4EA4-AA0A-D417215D4777}" type="datetimeFigureOut">
               <a:rPr lang="en-US" smtClean="0"/>
-              <a:t>1/24/2018</a:t>
+              <a:t>1/31/2018</a:t>
             </a:fld>
             <a:endParaRPr lang="en-US"/>
           </a:p>
@@ -2096,7 +2108,7 @@
           <a:p>
             <a:fld id="{25906620-5188-4EA4-AA0A-D417215D4777}" type="datetimeFigureOut">
               <a:rPr lang="en-US" smtClean="0"/>
-              <a:t>1/24/2018</a:t>
+              <a:t>1/31/2018</a:t>
             </a:fld>
             <a:endParaRPr lang="en-US"/>
           </a:p>
@@ -2353,7 +2365,7 @@
           <a:p>
             <a:fld id="{25906620-5188-4EA4-AA0A-D417215D4777}" type="datetimeFigureOut">
               <a:rPr lang="en-US" smtClean="0"/>
-              <a:t>1/24/2018</a:t>
+              <a:t>1/31/2018</a:t>
             </a:fld>
             <a:endParaRPr lang="en-US"/>
           </a:p>
@@ -2566,7 +2578,7 @@
           <a:p>
             <a:fld id="{25906620-5188-4EA4-AA0A-D417215D4777}" type="datetimeFigureOut">
               <a:rPr lang="en-US" smtClean="0"/>
-              <a:t>1/24/2018</a:t>
+              <a:t>1/31/2018</a:t>
             </a:fld>
             <a:endParaRPr lang="en-US"/>
           </a:p>
@@ -3020,7 +3032,10 @@
           <a:bodyPr/>
           <a:lstStyle/>
           <a:p>
-            <a:endParaRPr lang="en-US"/>
+            <a:r>
+              <a:rPr lang="en-US" dirty="0"/>
+              <a:t>Jacob</a:t>
+            </a:r>
           </a:p>
         </p:txBody>
       </p:sp>
@@ -3159,7 +3174,7 @@
           <p:cNvPr id="2" name="Title 1">
             <a:extLst>
               <a:ext uri="{FF2B5EF4-FFF2-40B4-BE49-F238E27FC236}">
-                <a16:creationId xmlns:a16="http://schemas.microsoft.com/office/drawing/2014/main" id="{B6273C62-671E-4E0F-ACD0-CA548991C749}"/>
+                <a16:creationId xmlns:a16="http://schemas.microsoft.com/office/drawing/2014/main" id="{79181036-5F41-4556-914E-31166A92D87B}"/>
               </a:ext>
             </a:extLst>
           </p:cNvPr>
@@ -3177,85 +3192,53 @@
           <a:p>
             <a:r>
               <a:rPr lang="en-US" dirty="0"/>
-              <a:t>Example 1</a:t>
-            </a:r>
-          </a:p>
-        </p:txBody>
-      </p:sp>
-      <p:sp>
-        <p:nvSpPr>
-          <p:cNvPr id="3" name="Content Placeholder 2">
+              <a:t>Graphic</a:t>
+            </a:r>
+          </a:p>
+        </p:txBody>
+      </p:sp>
+      <p:pic>
+        <p:nvPicPr>
+          <p:cNvPr id="15" name="Content Placeholder 14">
             <a:extLst>
               <a:ext uri="{FF2B5EF4-FFF2-40B4-BE49-F238E27FC236}">
-                <a16:creationId xmlns:a16="http://schemas.microsoft.com/office/drawing/2014/main" id="{80E46366-5933-4AD2-9B27-F35D946629BF}"/>
+                <a16:creationId xmlns:a16="http://schemas.microsoft.com/office/drawing/2014/main" id="{02E9FBB5-4C9C-4310-8165-DCC35C46FD60}"/>
               </a:ext>
             </a:extLst>
           </p:cNvPr>
-          <p:cNvSpPr>
-            <a:spLocks noGrp="1"/>
-          </p:cNvSpPr>
+          <p:cNvPicPr>
+            <a:picLocks noGrp="1" noChangeAspect="1"/>
+          </p:cNvPicPr>
           <p:nvPr>
             <p:ph idx="1"/>
           </p:nvPr>
-        </p:nvSpPr>
-        <p:spPr/>
-        <p:txBody>
-          <a:bodyPr/>
-          <a:lstStyle/>
-          <a:p>
-            <a:r>
-              <a:rPr lang="en-US" dirty="0"/>
-              <a:t>Inaccurate survey topics: abortion, drug use, or prostitution</a:t>
-            </a:r>
-          </a:p>
-          <a:p>
-            <a:r>
-              <a:rPr lang="en-US" dirty="0"/>
-              <a:t>Attributed to: embarrassment or lack of comfort in revealing true feelings or attitudes</a:t>
-            </a:r>
-          </a:p>
-          <a:p>
-            <a:r>
-              <a:rPr lang="en-US" dirty="0"/>
-              <a:t>Solutions: </a:t>
-            </a:r>
-          </a:p>
-          <a:p>
-            <a:pPr lvl="1"/>
-            <a:r>
-              <a:rPr lang="en-US" dirty="0"/>
-              <a:t>Indirect questions</a:t>
-            </a:r>
-          </a:p>
-          <a:p>
-            <a:pPr lvl="1"/>
-            <a:r>
-              <a:rPr lang="en-US" dirty="0"/>
-              <a:t>Forced choice items</a:t>
-            </a:r>
-          </a:p>
-          <a:p>
-            <a:pPr lvl="1"/>
-            <a:r>
-              <a:rPr lang="en-US" dirty="0"/>
-              <a:t>Proxy subjects</a:t>
-            </a:r>
-          </a:p>
-          <a:p>
-            <a:pPr marL="342892" lvl="1" indent="0">
-              <a:buNone/>
-            </a:pPr>
-            <a:r>
-              <a:rPr lang="en-US" dirty="0"/>
-              <a:t>(Stephanie)</a:t>
-            </a:r>
-          </a:p>
-        </p:txBody>
-      </p:sp>
+        </p:nvPicPr>
+        <p:blipFill>
+          <a:blip r:embed="rId2">
+            <a:extLst>
+              <a:ext uri="{28A0092B-C50C-407E-A947-70E740481C1C}">
+                <a14:useLocalDpi xmlns:a14="http://schemas.microsoft.com/office/drawing/2010/main" val="0"/>
+              </a:ext>
+              <a:ext uri="{96DAC541-7B7A-43D3-8B79-37D633B846F1}">
+                <asvg:svgBlip xmlns:asvg="http://schemas.microsoft.com/office/drawing/2016/SVG/main" r:embed="rId3"/>
+              </a:ext>
+            </a:extLst>
+          </a:blip>
+          <a:stretch>
+            <a:fillRect/>
+          </a:stretch>
+        </p:blipFill>
+        <p:spPr>
+          <a:xfrm>
+            <a:off x="1878401" y="1509714"/>
+            <a:ext cx="5387198" cy="4983160"/>
+          </a:xfrm>
+        </p:spPr>
+      </p:pic>
     </p:spTree>
     <p:extLst>
       <p:ext uri="{BB962C8B-B14F-4D97-AF65-F5344CB8AC3E}">
-        <p14:creationId xmlns:p14="http://schemas.microsoft.com/office/powerpoint/2010/main" val="3781735490"/>
+        <p14:creationId xmlns:p14="http://schemas.microsoft.com/office/powerpoint/2010/main" val="3815796439"/>
       </p:ext>
     </p:extLst>
   </p:cSld>
@@ -3287,6 +3270,100 @@
           <p:cNvPr id="2" name="Title 1">
             <a:extLst>
               <a:ext uri="{FF2B5EF4-FFF2-40B4-BE49-F238E27FC236}">
+                <a16:creationId xmlns:a16="http://schemas.microsoft.com/office/drawing/2014/main" id="{B6273C62-671E-4E0F-ACD0-CA548991C749}"/>
+              </a:ext>
+            </a:extLst>
+          </p:cNvPr>
+          <p:cNvSpPr>
+            <a:spLocks noGrp="1"/>
+          </p:cNvSpPr>
+          <p:nvPr>
+            <p:ph type="title"/>
+          </p:nvPr>
+        </p:nvSpPr>
+        <p:spPr/>
+        <p:txBody>
+          <a:bodyPr/>
+          <a:lstStyle/>
+          <a:p>
+            <a:r>
+              <a:rPr lang="en-US" dirty="0"/>
+              <a:t>Example 1</a:t>
+            </a:r>
+          </a:p>
+        </p:txBody>
+      </p:sp>
+      <p:sp>
+        <p:nvSpPr>
+          <p:cNvPr id="3" name="Content Placeholder 2">
+            <a:extLst>
+              <a:ext uri="{FF2B5EF4-FFF2-40B4-BE49-F238E27FC236}">
+                <a16:creationId xmlns:a16="http://schemas.microsoft.com/office/drawing/2014/main" id="{80E46366-5933-4AD2-9B27-F35D946629BF}"/>
+              </a:ext>
+            </a:extLst>
+          </p:cNvPr>
+          <p:cNvSpPr>
+            <a:spLocks noGrp="1"/>
+          </p:cNvSpPr>
+          <p:nvPr>
+            <p:ph idx="1"/>
+          </p:nvPr>
+        </p:nvSpPr>
+        <p:spPr/>
+        <p:txBody>
+          <a:bodyPr>
+            <a:normAutofit/>
+          </a:bodyPr>
+          <a:lstStyle/>
+          <a:p>
+            <a:r>
+              <a:rPr lang="en-US" dirty="0"/>
+              <a:t>Inaccurate survey topics: abortion, drug use, or prostitution</a:t>
+            </a:r>
+          </a:p>
+          <a:p>
+            <a:r>
+              <a:rPr lang="en-US" dirty="0"/>
+              <a:t>Attributed to: embarrassment or lack of comfort in revealing true feelings or attitudes (Stephanie)</a:t>
+            </a:r>
+          </a:p>
+        </p:txBody>
+      </p:sp>
+    </p:spTree>
+    <p:extLst>
+      <p:ext uri="{BB962C8B-B14F-4D97-AF65-F5344CB8AC3E}">
+        <p14:creationId xmlns:p14="http://schemas.microsoft.com/office/powerpoint/2010/main" val="3781735490"/>
+      </p:ext>
+    </p:extLst>
+  </p:cSld>
+  <p:clrMapOvr>
+    <a:masterClrMapping/>
+  </p:clrMapOvr>
+</p:sld>
+</file>
+
+<file path=ppt/slides/slide5.xml><?xml version="1.0" encoding="utf-8"?>
+<p:sld xmlns:a="http://schemas.openxmlformats.org/drawingml/2006/main" xmlns:r="http://schemas.openxmlformats.org/officeDocument/2006/relationships" xmlns:p="http://schemas.openxmlformats.org/presentationml/2006/main">
+  <p:cSld>
+    <p:spTree>
+      <p:nvGrpSpPr>
+        <p:cNvPr id="1" name=""/>
+        <p:cNvGrpSpPr/>
+        <p:nvPr/>
+      </p:nvGrpSpPr>
+      <p:grpSpPr>
+        <a:xfrm>
+          <a:off x="0" y="0"/>
+          <a:ext cx="0" cy="0"/>
+          <a:chOff x="0" y="0"/>
+          <a:chExt cx="0" cy="0"/>
+        </a:xfrm>
+      </p:grpSpPr>
+      <p:sp>
+        <p:nvSpPr>
+          <p:cNvPr id="2" name="Title 1">
+            <a:extLst>
+              <a:ext uri="{FF2B5EF4-FFF2-40B4-BE49-F238E27FC236}">
                 <a16:creationId xmlns:a16="http://schemas.microsoft.com/office/drawing/2014/main" id="{71D8C6A7-2AB9-40A6-A70A-2E847F263A44}"/>
               </a:ext>
             </a:extLst>
@@ -3366,7 +3443,149 @@
 </p:sld>
 </file>
 
-<file path=ppt/slides/slide5.xml><?xml version="1.0" encoding="utf-8"?>
+<file path=ppt/slides/slide6.xml><?xml version="1.0" encoding="utf-8"?>
+<p:sld xmlns:a="http://schemas.openxmlformats.org/drawingml/2006/main" xmlns:r="http://schemas.openxmlformats.org/officeDocument/2006/relationships" xmlns:p="http://schemas.openxmlformats.org/presentationml/2006/main">
+  <p:cSld>
+    <p:spTree>
+      <p:nvGrpSpPr>
+        <p:cNvPr id="1" name=""/>
+        <p:cNvGrpSpPr/>
+        <p:nvPr/>
+      </p:nvGrpSpPr>
+      <p:grpSpPr>
+        <a:xfrm>
+          <a:off x="0" y="0"/>
+          <a:ext cx="0" cy="0"/>
+          <a:chOff x="0" y="0"/>
+          <a:chExt cx="0" cy="0"/>
+        </a:xfrm>
+      </p:grpSpPr>
+      <p:sp>
+        <p:nvSpPr>
+          <p:cNvPr id="2" name="Title 1">
+            <a:extLst>
+              <a:ext uri="{FF2B5EF4-FFF2-40B4-BE49-F238E27FC236}">
+                <a16:creationId xmlns:a16="http://schemas.microsoft.com/office/drawing/2014/main" id="{B63572F6-5295-44E5-B7A6-B2C40C87CA0C}"/>
+              </a:ext>
+            </a:extLst>
+          </p:cNvPr>
+          <p:cNvSpPr>
+            <a:spLocks noGrp="1"/>
+          </p:cNvSpPr>
+          <p:nvPr>
+            <p:ph type="title"/>
+          </p:nvPr>
+        </p:nvSpPr>
+        <p:spPr/>
+        <p:txBody>
+          <a:bodyPr/>
+          <a:lstStyle/>
+          <a:p>
+            <a:r>
+              <a:rPr lang="en-US" dirty="0"/>
+              <a:t>Solutions</a:t>
+            </a:r>
+          </a:p>
+        </p:txBody>
+      </p:sp>
+      <p:sp>
+        <p:nvSpPr>
+          <p:cNvPr id="3" name="Content Placeholder 2">
+            <a:extLst>
+              <a:ext uri="{FF2B5EF4-FFF2-40B4-BE49-F238E27FC236}">
+                <a16:creationId xmlns:a16="http://schemas.microsoft.com/office/drawing/2014/main" id="{A33975D5-2645-4E39-942C-2E7FE928B532}"/>
+              </a:ext>
+            </a:extLst>
+          </p:cNvPr>
+          <p:cNvSpPr>
+            <a:spLocks noGrp="1"/>
+          </p:cNvSpPr>
+          <p:nvPr>
+            <p:ph idx="1"/>
+          </p:nvPr>
+        </p:nvSpPr>
+        <p:spPr/>
+        <p:txBody>
+          <a:bodyPr/>
+          <a:lstStyle/>
+          <a:p>
+            <a:r>
+              <a:rPr lang="en-US" dirty="0"/>
+              <a:t>Neutral questions</a:t>
+            </a:r>
+          </a:p>
+          <a:p>
+            <a:r>
+              <a:rPr lang="en-US" dirty="0"/>
+              <a:t>Bogus pipeline</a:t>
+            </a:r>
+          </a:p>
+          <a:p>
+            <a:pPr lvl="1"/>
+            <a:r>
+              <a:rPr lang="en-US" dirty="0"/>
+              <a:t>Pseudo lie detector</a:t>
+            </a:r>
+          </a:p>
+          <a:p>
+            <a:r>
+              <a:rPr lang="en-US" dirty="0"/>
+              <a:t>Self administration</a:t>
+            </a:r>
+          </a:p>
+          <a:p>
+            <a:r>
+              <a:rPr lang="en-US" dirty="0"/>
+              <a:t>Forced choice items</a:t>
+            </a:r>
+          </a:p>
+          <a:p>
+            <a:pPr lvl="1"/>
+            <a:r>
+              <a:rPr lang="en-US" dirty="0"/>
+              <a:t>Must pick a descriptive answer, but can force incorrect answers (Forced Choice)</a:t>
+            </a:r>
+          </a:p>
+          <a:p>
+            <a:r>
+              <a:rPr lang="en-US" dirty="0"/>
+              <a:t>Proxy subjects</a:t>
+            </a:r>
+          </a:p>
+          <a:p>
+            <a:pPr lvl="1"/>
+            <a:r>
+              <a:rPr lang="en-US" dirty="0"/>
+              <a:t>Ask your friends about you (</a:t>
+            </a:r>
+            <a:r>
+              <a:rPr lang="en-US" dirty="0" err="1"/>
+              <a:t>Nederhof</a:t>
+            </a:r>
+            <a:r>
+              <a:rPr lang="en-US" dirty="0"/>
+              <a:t>)</a:t>
+            </a:r>
+          </a:p>
+          <a:p>
+            <a:endParaRPr lang="en-US" dirty="0"/>
+          </a:p>
+        </p:txBody>
+      </p:sp>
+    </p:spTree>
+    <p:extLst>
+      <p:ext uri="{BB962C8B-B14F-4D97-AF65-F5344CB8AC3E}">
+        <p14:creationId xmlns:p14="http://schemas.microsoft.com/office/powerpoint/2010/main" val="3127975982"/>
+      </p:ext>
+    </p:extLst>
+  </p:cSld>
+  <p:clrMapOvr>
+    <a:masterClrMapping/>
+  </p:clrMapOvr>
+</p:sld>
+</file>
+
+<file path=ppt/slides/slide7.xml><?xml version="1.0" encoding="utf-8"?>
 <p:sld xmlns:a="http://schemas.openxmlformats.org/drawingml/2006/main" xmlns:r="http://schemas.openxmlformats.org/officeDocument/2006/relationships" xmlns:p="http://schemas.openxmlformats.org/presentationml/2006/main">
   <p:cSld>
     <p:bg>
@@ -3438,8 +3657,15 @@
           <a:p>
             <a:pPr algn="ctr"/>
             <a:r>
-              <a:rPr lang="en-US" sz="1950"/>
+              <a:rPr lang="en-US" sz="1950" dirty="0"/>
               <a:t>Study</a:t>
+            </a:r>
+            <a:br>
+              <a:rPr lang="en-US" sz="1950" dirty="0"/>
+            </a:br>
+            <a:r>
+              <a:rPr lang="en-US" sz="1950" dirty="0"/>
+              <a:t>(Phillips &amp; Clancy)</a:t>
             </a:r>
           </a:p>
         </p:txBody>
@@ -3489,7 +3715,7 @@
 </p:sld>
 </file>
 
-<file path=ppt/slides/slide6.xml><?xml version="1.0" encoding="utf-8"?>
+<file path=ppt/slides/slide8.xml><?xml version="1.0" encoding="utf-8"?>
 <p:sld xmlns:a="http://schemas.openxmlformats.org/drawingml/2006/main" xmlns:r="http://schemas.openxmlformats.org/officeDocument/2006/relationships" xmlns:p="http://schemas.openxmlformats.org/presentationml/2006/main">
   <p:cSld>
     <p:bg>
@@ -3562,7 +3788,7 @@
             <a:pPr algn="ctr"/>
             <a:r>
               <a:rPr lang="en-US" sz="1950" dirty="0"/>
-              <a:t>Study</a:t>
+              <a:t>Study (Phillips &amp; Clancy)</a:t>
             </a:r>
           </a:p>
         </p:txBody>
@@ -3603,6 +3829,232 @@
     <p:extLst>
       <p:ext uri="{BB962C8B-B14F-4D97-AF65-F5344CB8AC3E}">
         <p14:creationId xmlns:p14="http://schemas.microsoft.com/office/powerpoint/2010/main" val="2858126738"/>
+      </p:ext>
+    </p:extLst>
+  </p:cSld>
+  <p:clrMapOvr>
+    <a:masterClrMapping/>
+  </p:clrMapOvr>
+</p:sld>
+</file>
+
+<file path=ppt/slides/slide9.xml><?xml version="1.0" encoding="utf-8"?>
+<p:sld xmlns:a="http://schemas.openxmlformats.org/drawingml/2006/main" xmlns:r="http://schemas.openxmlformats.org/officeDocument/2006/relationships" xmlns:p="http://schemas.openxmlformats.org/presentationml/2006/main">
+  <p:cSld>
+    <p:spTree>
+      <p:nvGrpSpPr>
+        <p:cNvPr id="1" name=""/>
+        <p:cNvGrpSpPr/>
+        <p:nvPr/>
+      </p:nvGrpSpPr>
+      <p:grpSpPr>
+        <a:xfrm>
+          <a:off x="0" y="0"/>
+          <a:ext cx="0" cy="0"/>
+          <a:chOff x="0" y="0"/>
+          <a:chExt cx="0" cy="0"/>
+        </a:xfrm>
+      </p:grpSpPr>
+      <p:sp>
+        <p:nvSpPr>
+          <p:cNvPr id="2" name="Title 1">
+            <a:extLst>
+              <a:ext uri="{FF2B5EF4-FFF2-40B4-BE49-F238E27FC236}">
+                <a16:creationId xmlns:a16="http://schemas.microsoft.com/office/drawing/2014/main" id="{224E137E-7087-429F-84C8-6FA74E446727}"/>
+              </a:ext>
+            </a:extLst>
+          </p:cNvPr>
+          <p:cNvSpPr>
+            <a:spLocks noGrp="1"/>
+          </p:cNvSpPr>
+          <p:nvPr>
+            <p:ph type="title"/>
+          </p:nvPr>
+        </p:nvSpPr>
+        <p:spPr/>
+        <p:txBody>
+          <a:bodyPr/>
+          <a:lstStyle/>
+          <a:p>
+            <a:r>
+              <a:rPr lang="en-US" dirty="0"/>
+              <a:t>Bibliography</a:t>
+            </a:r>
+          </a:p>
+        </p:txBody>
+      </p:sp>
+      <p:sp>
+        <p:nvSpPr>
+          <p:cNvPr id="3" name="Content Placeholder 2">
+            <a:extLst>
+              <a:ext uri="{FF2B5EF4-FFF2-40B4-BE49-F238E27FC236}">
+                <a16:creationId xmlns:a16="http://schemas.microsoft.com/office/drawing/2014/main" id="{16A9F692-C1E3-4A8D-A1F0-EC171FDCD1A2}"/>
+              </a:ext>
+            </a:extLst>
+          </p:cNvPr>
+          <p:cNvSpPr>
+            <a:spLocks noGrp="1"/>
+          </p:cNvSpPr>
+          <p:nvPr>
+            <p:ph idx="1"/>
+          </p:nvPr>
+        </p:nvSpPr>
+        <p:spPr/>
+        <p:txBody>
+          <a:bodyPr>
+            <a:normAutofit fontScale="62500" lnSpcReduction="20000"/>
+          </a:bodyPr>
+          <a:lstStyle/>
+          <a:p>
+            <a:r>
+              <a:rPr lang="en-US" dirty="0"/>
+              <a:t>Forced Choice. (2008). In P. </a:t>
+            </a:r>
+            <a:r>
+              <a:rPr lang="en-US" dirty="0" err="1"/>
+              <a:t>Lavrakas</a:t>
+            </a:r>
+            <a:r>
+              <a:rPr lang="en-US" dirty="0"/>
+              <a:t>, </a:t>
+            </a:r>
+            <a:r>
+              <a:rPr lang="en-US" i="1" dirty="0"/>
+              <a:t>Encyclopedia of Survey Research Methods</a:t>
+            </a:r>
+            <a:r>
+              <a:rPr lang="en-US" dirty="0"/>
+              <a:t>. 2455 Teller Road, Thousand Oaks California 91320 United States of America: Sage Publications, Inc. </a:t>
+            </a:r>
+            <a:r>
+              <a:rPr lang="en-US" dirty="0">
+                <a:hlinkClick r:id="rId2"/>
+              </a:rPr>
+              <a:t>https://doi.org/10.4135/9781412963947.n193</a:t>
+            </a:r>
+            <a:endParaRPr lang="en-US" dirty="0"/>
+          </a:p>
+          <a:p>
+            <a:r>
+              <a:rPr lang="en-US" dirty="0" err="1"/>
+              <a:t>Lavrakas</a:t>
+            </a:r>
+            <a:r>
+              <a:rPr lang="en-US" dirty="0"/>
+              <a:t>, P. (2008). </a:t>
+            </a:r>
+            <a:r>
+              <a:rPr lang="en-US" i="1" dirty="0"/>
+              <a:t>Encyclopedia of Survey Research Methods</a:t>
+            </a:r>
+            <a:r>
+              <a:rPr lang="en-US" dirty="0"/>
+              <a:t>. 2455 Teller Road, Thousand Oaks California 91320 United States of America: Sage Publications, Inc. </a:t>
+            </a:r>
+            <a:r>
+              <a:rPr lang="en-US" dirty="0">
+                <a:hlinkClick r:id="rId3"/>
+              </a:rPr>
+              <a:t>https://doi.org/10.4135/9781412963947</a:t>
+            </a:r>
+            <a:endParaRPr lang="en-US" dirty="0"/>
+          </a:p>
+          <a:p>
+            <a:r>
+              <a:rPr lang="en-US" dirty="0" err="1"/>
+              <a:t>Nederhof</a:t>
+            </a:r>
+            <a:r>
+              <a:rPr lang="en-US" dirty="0"/>
+              <a:t>, A. J. (1985). Methods of coping with social desirability bias: a review. </a:t>
+            </a:r>
+            <a:r>
+              <a:rPr lang="en-US" i="1" dirty="0"/>
+              <a:t>European Journal of Social Psychology</a:t>
+            </a:r>
+            <a:r>
+              <a:rPr lang="en-US" dirty="0"/>
+              <a:t>, </a:t>
+            </a:r>
+            <a:r>
+              <a:rPr lang="en-US" i="1" dirty="0"/>
+              <a:t>15</a:t>
+            </a:r>
+            <a:r>
+              <a:rPr lang="en-US" dirty="0"/>
+              <a:t>(3), 263–280.</a:t>
+            </a:r>
+          </a:p>
+          <a:p>
+            <a:r>
+              <a:rPr lang="en-US" dirty="0"/>
+              <a:t>Phillips, D. L., &amp; Clancy, K. J. (1972). Some Effects of “Social Desirability” in Survey Studies. </a:t>
+            </a:r>
+            <a:r>
+              <a:rPr lang="en-US" i="1" dirty="0"/>
+              <a:t>American Journal of Sociology</a:t>
+            </a:r>
+            <a:r>
+              <a:rPr lang="en-US" dirty="0"/>
+              <a:t>, </a:t>
+            </a:r>
+            <a:r>
+              <a:rPr lang="en-US" i="1" dirty="0"/>
+              <a:t>77</a:t>
+            </a:r>
+            <a:r>
+              <a:rPr lang="en-US" dirty="0"/>
+              <a:t>(5), 921–940.</a:t>
+            </a:r>
+          </a:p>
+          <a:p>
+            <a:r>
+              <a:rPr lang="en-US" dirty="0"/>
+              <a:t>Social desirability bias. (2018, January 11). In </a:t>
+            </a:r>
+            <a:r>
+              <a:rPr lang="en-US" i="1" dirty="0"/>
+              <a:t>Wikipedia</a:t>
+            </a:r>
+            <a:r>
+              <a:rPr lang="en-US" dirty="0"/>
+              <a:t>. Retrieved from </a:t>
+            </a:r>
+            <a:r>
+              <a:rPr lang="en-US" dirty="0">
+                <a:hlinkClick r:id="rId4"/>
+              </a:rPr>
+              <a:t>https://en.wikipedia.org/w/index.php?title=Social_desirability_bias&amp;oldid=819810226</a:t>
+            </a:r>
+            <a:endParaRPr lang="en-US" dirty="0"/>
+          </a:p>
+          <a:p>
+            <a:r>
+              <a:rPr lang="en-US" dirty="0"/>
+              <a:t>Stephanie. (</a:t>
+            </a:r>
+            <a:r>
+              <a:rPr lang="en-US" dirty="0" err="1"/>
+              <a:t>n.d.</a:t>
+            </a:r>
+            <a:r>
+              <a:rPr lang="en-US" dirty="0"/>
+              <a:t>). Bias in Statistics: Definition, Selection Bias &amp; Survivorship Bias. Retrieved January 25, 2018, from </a:t>
+            </a:r>
+            <a:r>
+              <a:rPr lang="en-US" dirty="0">
+                <a:hlinkClick r:id="rId5"/>
+              </a:rPr>
+              <a:t>http://www.statisticshowto.com/what-is-bias/</a:t>
+            </a:r>
+            <a:endParaRPr lang="en-US" dirty="0"/>
+          </a:p>
+        </p:txBody>
+      </p:sp>
+    </p:spTree>
+    <p:extLst>
+      <p:ext uri="{BB962C8B-B14F-4D97-AF65-F5344CB8AC3E}">
+        <p14:creationId xmlns:p14="http://schemas.microsoft.com/office/powerpoint/2010/main" val="4285962440"/>
       </p:ext>
     </p:extLst>
   </p:cSld>

</xml_diff>